<commit_message>
Updated slides with better fonts
</commit_message>
<xml_diff>
--- a/VSLive_LasVegas2023_W19_ArchitectZeroDowntime.pptx
+++ b/VSLive_LasVegas2023_W19_ArchitectZeroDowntime.pptx
@@ -9,10 +9,10 @@
     <p:sldMasterId id="2147483760" r:id="rId5"/>
   </p:sldMasterIdLst>
   <p:notesMasterIdLst>
-    <p:notesMasterId r:id="rId45"/>
+    <p:notesMasterId r:id="rId46"/>
   </p:notesMasterIdLst>
   <p:handoutMasterIdLst>
-    <p:handoutMasterId r:id="rId46"/>
+    <p:handoutMasterId r:id="rId47"/>
   </p:handoutMasterIdLst>
   <p:sldIdLst>
     <p:sldId id="258" r:id="rId6"/>
@@ -52,8 +52,9 @@
     <p:sldId id="369" r:id="rId40"/>
     <p:sldId id="370" r:id="rId41"/>
     <p:sldId id="304" r:id="rId42"/>
-    <p:sldId id="259" r:id="rId43"/>
-    <p:sldId id="382" r:id="rId44"/>
+    <p:sldId id="385" r:id="rId43"/>
+    <p:sldId id="259" r:id="rId44"/>
+    <p:sldId id="382" r:id="rId45"/>
   </p:sldIdLst>
   <p:sldSz cx="9144000" cy="5143500" type="screen16x9"/>
   <p:notesSz cx="6858000" cy="9144000"/>
@@ -918,7 +919,7 @@
           <a:p>
             <a:fld id="{D088F999-7A4E-6B4F-9FED-EF75B73AD044}" type="datetimeFigureOut">
               <a:rPr lang="en-US" smtClean="0"/>
-              <a:t>3/9/2023</a:t>
+              <a:t>3/22/2023</a:t>
             </a:fld>
             <a:endParaRPr lang="en-US"/>
           </a:p>
@@ -1086,7 +1087,7 @@
           <a:p>
             <a:fld id="{D088F999-7A4E-6B4F-9FED-EF75B73AD044}" type="datetimeFigureOut">
               <a:rPr lang="en-US" smtClean="0"/>
-              <a:t>3/9/2023</a:t>
+              <a:t>3/22/2023</a:t>
             </a:fld>
             <a:endParaRPr lang="en-US"/>
           </a:p>
@@ -1264,7 +1265,7 @@
           <a:p>
             <a:fld id="{D088F999-7A4E-6B4F-9FED-EF75B73AD044}" type="datetimeFigureOut">
               <a:rPr lang="en-US" smtClean="0"/>
-              <a:t>3/9/2023</a:t>
+              <a:t>3/22/2023</a:t>
             </a:fld>
             <a:endParaRPr lang="en-US"/>
           </a:p>
@@ -1504,7 +1505,7 @@
             <a:fld id="{3FE51E94-D08C-431E-88FC-7EB62E529A19}" type="datetimeFigureOut">
               <a:rPr lang="en-US" smtClean="0"/>
               <a:pPr/>
-              <a:t>3/9/2023</a:t>
+              <a:t>3/22/2023</a:t>
             </a:fld>
             <a:endParaRPr lang="en-US"/>
           </a:p>
@@ -1674,7 +1675,7 @@
             <a:fld id="{3FE51E94-D08C-431E-88FC-7EB62E529A19}" type="datetimeFigureOut">
               <a:rPr lang="en-US" smtClean="0"/>
               <a:pPr/>
-              <a:t>3/9/2023</a:t>
+              <a:t>3/22/2023</a:t>
             </a:fld>
             <a:endParaRPr lang="en-US"/>
           </a:p>
@@ -1921,7 +1922,7 @@
             <a:fld id="{3FE51E94-D08C-431E-88FC-7EB62E529A19}" type="datetimeFigureOut">
               <a:rPr lang="en-US" smtClean="0"/>
               <a:pPr/>
-              <a:t>3/9/2023</a:t>
+              <a:t>3/22/2023</a:t>
             </a:fld>
             <a:endParaRPr lang="en-US"/>
           </a:p>
@@ -2208,7 +2209,7 @@
             <a:fld id="{3FE51E94-D08C-431E-88FC-7EB62E529A19}" type="datetimeFigureOut">
               <a:rPr lang="en-US" smtClean="0"/>
               <a:pPr/>
-              <a:t>3/9/2023</a:t>
+              <a:t>3/22/2023</a:t>
             </a:fld>
             <a:endParaRPr lang="en-US"/>
           </a:p>
@@ -2634,7 +2635,7 @@
             <a:fld id="{3FE51E94-D08C-431E-88FC-7EB62E529A19}" type="datetimeFigureOut">
               <a:rPr lang="en-US" smtClean="0"/>
               <a:pPr/>
-              <a:t>3/9/2023</a:t>
+              <a:t>3/22/2023</a:t>
             </a:fld>
             <a:endParaRPr lang="en-US"/>
           </a:p>
@@ -2753,7 +2754,7 @@
             <a:fld id="{3FE51E94-D08C-431E-88FC-7EB62E529A19}" type="datetimeFigureOut">
               <a:rPr lang="en-US" smtClean="0"/>
               <a:pPr/>
-              <a:t>3/9/2023</a:t>
+              <a:t>3/22/2023</a:t>
             </a:fld>
             <a:endParaRPr lang="en-US"/>
           </a:p>
@@ -2850,7 +2851,7 @@
             <a:fld id="{3FE51E94-D08C-431E-88FC-7EB62E529A19}" type="datetimeFigureOut">
               <a:rPr lang="en-US" smtClean="0"/>
               <a:pPr/>
-              <a:t>3/9/2023</a:t>
+              <a:t>3/22/2023</a:t>
             </a:fld>
             <a:endParaRPr lang="en-US"/>
           </a:p>
@@ -3127,7 +3128,7 @@
             <a:fld id="{3FE51E94-D08C-431E-88FC-7EB62E529A19}" type="datetimeFigureOut">
               <a:rPr lang="en-US" smtClean="0"/>
               <a:pPr/>
-              <a:t>3/9/2023</a:t>
+              <a:t>3/22/2023</a:t>
             </a:fld>
             <a:endParaRPr lang="en-US"/>
           </a:p>
@@ -3296,7 +3297,7 @@
           <a:p>
             <a:fld id="{D088F999-7A4E-6B4F-9FED-EF75B73AD044}" type="datetimeFigureOut">
               <a:rPr lang="en-US" smtClean="0"/>
-              <a:t>3/9/2023</a:t>
+              <a:t>3/22/2023</a:t>
             </a:fld>
             <a:endParaRPr lang="en-US"/>
           </a:p>
@@ -3552,7 +3553,7 @@
             <a:fld id="{3FE51E94-D08C-431E-88FC-7EB62E529A19}" type="datetimeFigureOut">
               <a:rPr lang="en-US" smtClean="0"/>
               <a:pPr/>
-              <a:t>3/9/2023</a:t>
+              <a:t>3/22/2023</a:t>
             </a:fld>
             <a:endParaRPr lang="en-US"/>
           </a:p>
@@ -3722,7 +3723,7 @@
             <a:fld id="{3FE51E94-D08C-431E-88FC-7EB62E529A19}" type="datetimeFigureOut">
               <a:rPr lang="en-US" smtClean="0"/>
               <a:pPr/>
-              <a:t>3/9/2023</a:t>
+              <a:t>3/22/2023</a:t>
             </a:fld>
             <a:endParaRPr lang="en-US"/>
           </a:p>
@@ -3902,7 +3903,7 @@
             <a:fld id="{3FE51E94-D08C-431E-88FC-7EB62E529A19}" type="datetimeFigureOut">
               <a:rPr lang="en-US" smtClean="0"/>
               <a:pPr/>
-              <a:t>3/9/2023</a:t>
+              <a:t>3/22/2023</a:t>
             </a:fld>
             <a:endParaRPr lang="en-US"/>
           </a:p>
@@ -4199,7 +4200,7 @@
           <a:p>
             <a:fld id="{D088F999-7A4E-6B4F-9FED-EF75B73AD044}" type="datetimeFigureOut">
               <a:rPr lang="en-US" smtClean="0"/>
-              <a:t>3/9/2023</a:t>
+              <a:t>3/22/2023</a:t>
             </a:fld>
             <a:endParaRPr lang="en-US"/>
           </a:p>
@@ -4367,7 +4368,7 @@
           <a:p>
             <a:fld id="{D088F999-7A4E-6B4F-9FED-EF75B73AD044}" type="datetimeFigureOut">
               <a:rPr lang="en-US" smtClean="0"/>
-              <a:t>3/9/2023</a:t>
+              <a:t>3/22/2023</a:t>
             </a:fld>
             <a:endParaRPr lang="en-US"/>
           </a:p>
@@ -4612,7 +4613,7 @@
           <a:p>
             <a:fld id="{D088F999-7A4E-6B4F-9FED-EF75B73AD044}" type="datetimeFigureOut">
               <a:rPr lang="en-US" smtClean="0"/>
-              <a:t>3/9/2023</a:t>
+              <a:t>3/22/2023</a:t>
             </a:fld>
             <a:endParaRPr lang="en-US"/>
           </a:p>
@@ -4897,7 +4898,7 @@
           <a:p>
             <a:fld id="{D088F999-7A4E-6B4F-9FED-EF75B73AD044}" type="datetimeFigureOut">
               <a:rPr lang="en-US" smtClean="0"/>
-              <a:t>3/9/2023</a:t>
+              <a:t>3/22/2023</a:t>
             </a:fld>
             <a:endParaRPr lang="en-US"/>
           </a:p>
@@ -5316,7 +5317,7 @@
           <a:p>
             <a:fld id="{D088F999-7A4E-6B4F-9FED-EF75B73AD044}" type="datetimeFigureOut">
               <a:rPr lang="en-US" smtClean="0"/>
-              <a:t>3/9/2023</a:t>
+              <a:t>3/22/2023</a:t>
             </a:fld>
             <a:endParaRPr lang="en-US"/>
           </a:p>
@@ -5433,7 +5434,7 @@
           <a:p>
             <a:fld id="{D088F999-7A4E-6B4F-9FED-EF75B73AD044}" type="datetimeFigureOut">
               <a:rPr lang="en-US" smtClean="0"/>
-              <a:t>3/9/2023</a:t>
+              <a:t>3/22/2023</a:t>
             </a:fld>
             <a:endParaRPr lang="en-US"/>
           </a:p>
@@ -5678,7 +5679,7 @@
           <a:p>
             <a:fld id="{D088F999-7A4E-6B4F-9FED-EF75B73AD044}" type="datetimeFigureOut">
               <a:rPr lang="en-US" smtClean="0"/>
-              <a:t>3/9/2023</a:t>
+              <a:t>3/22/2023</a:t>
             </a:fld>
             <a:endParaRPr lang="en-US"/>
           </a:p>
@@ -5773,7 +5774,7 @@
           <a:p>
             <a:fld id="{D088F999-7A4E-6B4F-9FED-EF75B73AD044}" type="datetimeFigureOut">
               <a:rPr lang="en-US" smtClean="0"/>
-              <a:t>3/9/2023</a:t>
+              <a:t>3/22/2023</a:t>
             </a:fld>
             <a:endParaRPr lang="en-US"/>
           </a:p>
@@ -6048,7 +6049,7 @@
           <a:p>
             <a:fld id="{D088F999-7A4E-6B4F-9FED-EF75B73AD044}" type="datetimeFigureOut">
               <a:rPr lang="en-US" smtClean="0"/>
-              <a:t>3/9/2023</a:t>
+              <a:t>3/22/2023</a:t>
             </a:fld>
             <a:endParaRPr lang="en-US"/>
           </a:p>
@@ -6303,7 +6304,7 @@
           <a:p>
             <a:fld id="{D088F999-7A4E-6B4F-9FED-EF75B73AD044}" type="datetimeFigureOut">
               <a:rPr lang="en-US" smtClean="0"/>
-              <a:t>3/9/2023</a:t>
+              <a:t>3/22/2023</a:t>
             </a:fld>
             <a:endParaRPr lang="en-US"/>
           </a:p>
@@ -6471,7 +6472,7 @@
           <a:p>
             <a:fld id="{D088F999-7A4E-6B4F-9FED-EF75B73AD044}" type="datetimeFigureOut">
               <a:rPr lang="en-US" smtClean="0"/>
-              <a:t>3/9/2023</a:t>
+              <a:t>3/22/2023</a:t>
             </a:fld>
             <a:endParaRPr lang="en-US"/>
           </a:p>
@@ -6649,7 +6650,7 @@
           <a:p>
             <a:fld id="{D088F999-7A4E-6B4F-9FED-EF75B73AD044}" type="datetimeFigureOut">
               <a:rPr lang="en-US" smtClean="0"/>
-              <a:t>3/9/2023</a:t>
+              <a:t>3/22/2023</a:t>
             </a:fld>
             <a:endParaRPr lang="en-US"/>
           </a:p>
@@ -6890,7 +6891,7 @@
             <a:fld id="{3FE51E94-D08C-431E-88FC-7EB62E529A19}" type="datetimeFigureOut">
               <a:rPr lang="en-US" smtClean="0"/>
               <a:pPr/>
-              <a:t>3/9/2023</a:t>
+              <a:t>3/22/2023</a:t>
             </a:fld>
             <a:endParaRPr lang="en-US"/>
           </a:p>
@@ -7060,7 +7061,7 @@
             <a:fld id="{3FE51E94-D08C-431E-88FC-7EB62E529A19}" type="datetimeFigureOut">
               <a:rPr lang="en-US" smtClean="0"/>
               <a:pPr/>
-              <a:t>3/9/2023</a:t>
+              <a:t>3/22/2023</a:t>
             </a:fld>
             <a:endParaRPr lang="en-US"/>
           </a:p>
@@ -7307,7 +7308,7 @@
             <a:fld id="{3FE51E94-D08C-431E-88FC-7EB62E529A19}" type="datetimeFigureOut">
               <a:rPr lang="en-US" smtClean="0"/>
               <a:pPr/>
-              <a:t>3/9/2023</a:t>
+              <a:t>3/22/2023</a:t>
             </a:fld>
             <a:endParaRPr lang="en-US"/>
           </a:p>
@@ -7594,7 +7595,7 @@
             <a:fld id="{3FE51E94-D08C-431E-88FC-7EB62E529A19}" type="datetimeFigureOut">
               <a:rPr lang="en-US" smtClean="0"/>
               <a:pPr/>
-              <a:t>3/9/2023</a:t>
+              <a:t>3/22/2023</a:t>
             </a:fld>
             <a:endParaRPr lang="en-US"/>
           </a:p>
@@ -8015,7 +8016,7 @@
             <a:fld id="{3FE51E94-D08C-431E-88FC-7EB62E529A19}" type="datetimeFigureOut">
               <a:rPr lang="en-US" smtClean="0"/>
               <a:pPr/>
-              <a:t>3/9/2023</a:t>
+              <a:t>3/22/2023</a:t>
             </a:fld>
             <a:endParaRPr lang="en-US"/>
           </a:p>
@@ -8301,7 +8302,7 @@
           <a:p>
             <a:fld id="{D088F999-7A4E-6B4F-9FED-EF75B73AD044}" type="datetimeFigureOut">
               <a:rPr lang="en-US" smtClean="0"/>
-              <a:t>3/9/2023</a:t>
+              <a:t>3/22/2023</a:t>
             </a:fld>
             <a:endParaRPr lang="en-US"/>
           </a:p>
@@ -8419,7 +8420,7 @@
             <a:fld id="{3FE51E94-D08C-431E-88FC-7EB62E529A19}" type="datetimeFigureOut">
               <a:rPr lang="en-US" smtClean="0"/>
               <a:pPr/>
-              <a:t>3/9/2023</a:t>
+              <a:t>3/22/2023</a:t>
             </a:fld>
             <a:endParaRPr lang="en-US"/>
           </a:p>
@@ -8516,7 +8517,7 @@
             <a:fld id="{3FE51E94-D08C-431E-88FC-7EB62E529A19}" type="datetimeFigureOut">
               <a:rPr lang="en-US" smtClean="0"/>
               <a:pPr/>
-              <a:t>3/9/2023</a:t>
+              <a:t>3/22/2023</a:t>
             </a:fld>
             <a:endParaRPr lang="en-US"/>
           </a:p>
@@ -8793,7 +8794,7 @@
             <a:fld id="{3FE51E94-D08C-431E-88FC-7EB62E529A19}" type="datetimeFigureOut">
               <a:rPr lang="en-US" smtClean="0"/>
               <a:pPr/>
-              <a:t>3/9/2023</a:t>
+              <a:t>3/22/2023</a:t>
             </a:fld>
             <a:endParaRPr lang="en-US"/>
           </a:p>
@@ -9050,7 +9051,7 @@
             <a:fld id="{3FE51E94-D08C-431E-88FC-7EB62E529A19}" type="datetimeFigureOut">
               <a:rPr lang="en-US" smtClean="0"/>
               <a:pPr/>
-              <a:t>3/9/2023</a:t>
+              <a:t>3/22/2023</a:t>
             </a:fld>
             <a:endParaRPr lang="en-US"/>
           </a:p>
@@ -9220,7 +9221,7 @@
             <a:fld id="{3FE51E94-D08C-431E-88FC-7EB62E529A19}" type="datetimeFigureOut">
               <a:rPr lang="en-US" smtClean="0"/>
               <a:pPr/>
-              <a:t>3/9/2023</a:t>
+              <a:t>3/22/2023</a:t>
             </a:fld>
             <a:endParaRPr lang="en-US"/>
           </a:p>
@@ -9400,7 +9401,7 @@
             <a:fld id="{3FE51E94-D08C-431E-88FC-7EB62E529A19}" type="datetimeFigureOut">
               <a:rPr lang="en-US" smtClean="0"/>
               <a:pPr/>
-              <a:t>3/9/2023</a:t>
+              <a:t>3/22/2023</a:t>
             </a:fld>
             <a:endParaRPr lang="en-US"/>
           </a:p>
@@ -9656,7 +9657,7 @@
             <a:fld id="{3FE51E94-D08C-431E-88FC-7EB62E529A19}" type="datetimeFigureOut">
               <a:rPr lang="en-US" smtClean="0"/>
               <a:pPr/>
-              <a:t>3/9/2023</a:t>
+              <a:t>3/22/2023</a:t>
             </a:fld>
             <a:endParaRPr lang="en-US"/>
           </a:p>
@@ -9826,7 +9827,7 @@
             <a:fld id="{3FE51E94-D08C-431E-88FC-7EB62E529A19}" type="datetimeFigureOut">
               <a:rPr lang="en-US" smtClean="0"/>
               <a:pPr/>
-              <a:t>3/9/2023</a:t>
+              <a:t>3/22/2023</a:t>
             </a:fld>
             <a:endParaRPr lang="en-US"/>
           </a:p>
@@ -10073,7 +10074,7 @@
             <a:fld id="{3FE51E94-D08C-431E-88FC-7EB62E529A19}" type="datetimeFigureOut">
               <a:rPr lang="en-US" smtClean="0"/>
               <a:pPr/>
-              <a:t>3/9/2023</a:t>
+              <a:t>3/22/2023</a:t>
             </a:fld>
             <a:endParaRPr lang="en-US"/>
           </a:p>
@@ -10360,7 +10361,7 @@
             <a:fld id="{3FE51E94-D08C-431E-88FC-7EB62E529A19}" type="datetimeFigureOut">
               <a:rPr lang="en-US" smtClean="0"/>
               <a:pPr/>
-              <a:t>3/9/2023</a:t>
+              <a:t>3/22/2023</a:t>
             </a:fld>
             <a:endParaRPr lang="en-US"/>
           </a:p>
@@ -10780,7 +10781,7 @@
           <a:p>
             <a:fld id="{D088F999-7A4E-6B4F-9FED-EF75B73AD044}" type="datetimeFigureOut">
               <a:rPr lang="en-US" smtClean="0"/>
-              <a:t>3/9/2023</a:t>
+              <a:t>3/22/2023</a:t>
             </a:fld>
             <a:endParaRPr lang="en-US"/>
           </a:p>
@@ -11200,7 +11201,7 @@
             <a:fld id="{3FE51E94-D08C-431E-88FC-7EB62E529A19}" type="datetimeFigureOut">
               <a:rPr lang="en-US" smtClean="0"/>
               <a:pPr/>
-              <a:t>3/9/2023</a:t>
+              <a:t>3/22/2023</a:t>
             </a:fld>
             <a:endParaRPr lang="en-US"/>
           </a:p>
@@ -11319,7 +11320,7 @@
             <a:fld id="{3FE51E94-D08C-431E-88FC-7EB62E529A19}" type="datetimeFigureOut">
               <a:rPr lang="en-US" smtClean="0"/>
               <a:pPr/>
-              <a:t>3/9/2023</a:t>
+              <a:t>3/22/2023</a:t>
             </a:fld>
             <a:endParaRPr lang="en-US"/>
           </a:p>
@@ -11416,7 +11417,7 @@
             <a:fld id="{3FE51E94-D08C-431E-88FC-7EB62E529A19}" type="datetimeFigureOut">
               <a:rPr lang="en-US" smtClean="0"/>
               <a:pPr/>
-              <a:t>3/9/2023</a:t>
+              <a:t>3/22/2023</a:t>
             </a:fld>
             <a:endParaRPr lang="en-US"/>
           </a:p>
@@ -11693,7 +11694,7 @@
             <a:fld id="{3FE51E94-D08C-431E-88FC-7EB62E529A19}" type="datetimeFigureOut">
               <a:rPr lang="en-US" smtClean="0"/>
               <a:pPr/>
-              <a:t>3/9/2023</a:t>
+              <a:t>3/22/2023</a:t>
             </a:fld>
             <a:endParaRPr lang="en-US"/>
           </a:p>
@@ -11950,7 +11951,7 @@
             <a:fld id="{3FE51E94-D08C-431E-88FC-7EB62E529A19}" type="datetimeFigureOut">
               <a:rPr lang="en-US" smtClean="0"/>
               <a:pPr/>
-              <a:t>3/9/2023</a:t>
+              <a:t>3/22/2023</a:t>
             </a:fld>
             <a:endParaRPr lang="en-US"/>
           </a:p>
@@ -12120,7 +12121,7 @@
             <a:fld id="{3FE51E94-D08C-431E-88FC-7EB62E529A19}" type="datetimeFigureOut">
               <a:rPr lang="en-US" smtClean="0"/>
               <a:pPr/>
-              <a:t>3/9/2023</a:t>
+              <a:t>3/22/2023</a:t>
             </a:fld>
             <a:endParaRPr lang="en-US"/>
           </a:p>
@@ -12300,7 +12301,7 @@
             <a:fld id="{3FE51E94-D08C-431E-88FC-7EB62E529A19}" type="datetimeFigureOut">
               <a:rPr lang="en-US" smtClean="0"/>
               <a:pPr/>
-              <a:t>3/9/2023</a:t>
+              <a:t>3/22/2023</a:t>
             </a:fld>
             <a:endParaRPr lang="en-US"/>
           </a:p>
@@ -12418,7 +12419,7 @@
           <a:p>
             <a:fld id="{D088F999-7A4E-6B4F-9FED-EF75B73AD044}" type="datetimeFigureOut">
               <a:rPr lang="en-US" smtClean="0"/>
-              <a:t>3/9/2023</a:t>
+              <a:t>3/22/2023</a:t>
             </a:fld>
             <a:endParaRPr lang="en-US"/>
           </a:p>
@@ -12513,7 +12514,7 @@
           <a:p>
             <a:fld id="{D088F999-7A4E-6B4F-9FED-EF75B73AD044}" type="datetimeFigureOut">
               <a:rPr lang="en-US" smtClean="0"/>
-              <a:t>3/9/2023</a:t>
+              <a:t>3/22/2023</a:t>
             </a:fld>
             <a:endParaRPr lang="en-US"/>
           </a:p>
@@ -12788,7 +12789,7 @@
           <a:p>
             <a:fld id="{D088F999-7A4E-6B4F-9FED-EF75B73AD044}" type="datetimeFigureOut">
               <a:rPr lang="en-US" smtClean="0"/>
-              <a:t>3/9/2023</a:t>
+              <a:t>3/22/2023</a:t>
             </a:fld>
             <a:endParaRPr lang="en-US"/>
           </a:p>
@@ -13040,7 +13041,7 @@
           <a:p>
             <a:fld id="{D088F999-7A4E-6B4F-9FED-EF75B73AD044}" type="datetimeFigureOut">
               <a:rPr lang="en-US" smtClean="0"/>
-              <a:t>3/9/2023</a:t>
+              <a:t>3/22/2023</a:t>
             </a:fld>
             <a:endParaRPr lang="en-US"/>
           </a:p>
@@ -13260,7 +13261,7 @@
           <a:p>
             <a:fld id="{D088F999-7A4E-6B4F-9FED-EF75B73AD044}" type="datetimeFigureOut">
               <a:rPr lang="en-US" smtClean="0"/>
-              <a:t>3/9/2023</a:t>
+              <a:t>3/22/2023</a:t>
             </a:fld>
             <a:endParaRPr lang="en-US"/>
           </a:p>
@@ -13780,7 +13781,7 @@
             <a:fld id="{3FE51E94-D08C-431E-88FC-7EB62E529A19}" type="datetimeFigureOut">
               <a:rPr lang="en-US" smtClean="0"/>
               <a:pPr/>
-              <a:t>3/9/2023</a:t>
+              <a:t>3/22/2023</a:t>
             </a:fld>
             <a:endParaRPr lang="en-US"/>
           </a:p>
@@ -14299,7 +14300,7 @@
           <a:p>
             <a:fld id="{D088F999-7A4E-6B4F-9FED-EF75B73AD044}" type="datetimeFigureOut">
               <a:rPr lang="en-US" smtClean="0"/>
-              <a:t>3/9/2023</a:t>
+              <a:t>3/22/2023</a:t>
             </a:fld>
             <a:endParaRPr lang="en-US"/>
           </a:p>
@@ -14816,7 +14817,7 @@
           <a:p>
             <a:fld id="{D088F999-7A4E-6B4F-9FED-EF75B73AD044}" type="datetimeFigureOut">
               <a:rPr lang="en-US" smtClean="0"/>
-              <a:t>3/9/2023</a:t>
+              <a:t>3/22/2023</a:t>
             </a:fld>
             <a:endParaRPr lang="en-US"/>
           </a:p>
@@ -15333,7 +15334,7 @@
           <a:p>
             <a:fld id="{D088F999-7A4E-6B4F-9FED-EF75B73AD044}" type="datetimeFigureOut">
               <a:rPr lang="en-US" smtClean="0"/>
-              <a:t>3/9/2023</a:t>
+              <a:t>3/22/2023</a:t>
             </a:fld>
             <a:endParaRPr lang="en-US"/>
           </a:p>
@@ -16364,7 +16365,7 @@
         </p:spPr>
         <p:txBody>
           <a:bodyPr>
-            <a:normAutofit/>
+            <a:normAutofit fontScale="92500"/>
           </a:bodyPr>
           <a:lstStyle/>
           <a:p>
@@ -16376,7 +16377,7 @@
               <a:buChar char="o"/>
             </a:pPr>
             <a:r>
-              <a:rPr lang="en-GB" sz="1600" dirty="0">
+              <a:rPr lang="en-GB" sz="2400" dirty="0">
                 <a:solidFill>
                   <a:schemeClr val="bg2">
                     <a:lumMod val="10000"/>
@@ -16397,7 +16398,7 @@
               <a:buChar char="o"/>
             </a:pPr>
             <a:r>
-              <a:rPr lang="en-GB" sz="1600" dirty="0">
+              <a:rPr lang="en-GB" sz="2400" dirty="0">
                 <a:solidFill>
                   <a:schemeClr val="bg2">
                     <a:lumMod val="10000"/>
@@ -16418,7 +16419,7 @@
               <a:buChar char="o"/>
             </a:pPr>
             <a:r>
-              <a:rPr lang="en-GB" sz="1600" dirty="0">
+              <a:rPr lang="en-GB" sz="2400" dirty="0">
                 <a:solidFill>
                   <a:schemeClr val="bg2">
                     <a:lumMod val="10000"/>
@@ -16439,7 +16440,7 @@
               <a:buChar char="o"/>
             </a:pPr>
             <a:r>
-              <a:rPr lang="en-GB" sz="1600" dirty="0">
+              <a:rPr lang="en-GB" sz="2400" dirty="0">
                 <a:solidFill>
                   <a:schemeClr val="bg2">
                     <a:lumMod val="10000"/>
@@ -16460,7 +16461,7 @@
               <a:buChar char="o"/>
             </a:pPr>
             <a:r>
-              <a:rPr lang="en-GB" sz="1600" dirty="0">
+              <a:rPr lang="en-GB" sz="2400" dirty="0">
                 <a:solidFill>
                   <a:schemeClr val="bg2">
                     <a:lumMod val="10000"/>
@@ -16541,7 +16542,7 @@
         <p:spPr/>
         <p:txBody>
           <a:bodyPr>
-            <a:normAutofit fontScale="92500"/>
+            <a:normAutofit/>
           </a:bodyPr>
           <a:lstStyle/>
           <a:p>
@@ -16553,7 +16554,7 @@
               <a:buChar char="o"/>
             </a:pPr>
             <a:r>
-              <a:rPr lang="en-GB" sz="2100" dirty="0">
+              <a:rPr lang="en-GB" sz="2000" dirty="0">
                 <a:solidFill>
                   <a:schemeClr val="bg2">
                     <a:lumMod val="10000"/>
@@ -16574,7 +16575,7 @@
               <a:buChar char="o"/>
             </a:pPr>
             <a:r>
-              <a:rPr lang="en-GB" sz="2100" dirty="0">
+              <a:rPr lang="en-GB" sz="2000" dirty="0">
                 <a:solidFill>
                   <a:schemeClr val="bg2">
                     <a:lumMod val="10000"/>
@@ -16595,7 +16596,7 @@
               <a:buChar char="o"/>
             </a:pPr>
             <a:r>
-              <a:rPr lang="en-US" sz="2100" dirty="0">
+              <a:rPr lang="en-US" sz="2000" dirty="0">
                 <a:solidFill>
                   <a:srgbClr val="444444"/>
                 </a:solidFill>
@@ -16614,7 +16615,7 @@
               <a:buChar char="o"/>
             </a:pPr>
             <a:r>
-              <a:rPr lang="en-GB" sz="2100" dirty="0">
+              <a:rPr lang="en-GB" sz="2000" dirty="0">
                 <a:solidFill>
                   <a:schemeClr val="bg2">
                     <a:lumMod val="10000"/>
@@ -16635,7 +16636,7 @@
               <a:buChar char="o"/>
             </a:pPr>
             <a:r>
-              <a:rPr lang="en-GB" sz="2100" dirty="0">
+              <a:rPr lang="en-GB" sz="2000" dirty="0">
                 <a:solidFill>
                   <a:schemeClr val="bg2">
                     <a:lumMod val="10000"/>
@@ -17312,20 +17313,33 @@
           <a:lstStyle/>
           <a:p>
             <a:r>
-              <a:rPr lang="en-US" dirty="0"/>
+              <a:rPr lang="en-US" sz="2800" dirty="0"/>
               <a:t>The process is similar for splitting tables</a:t>
             </a:r>
           </a:p>
           <a:p>
             <a:r>
-              <a:rPr lang="en-US" dirty="0"/>
+              <a:rPr lang="en-US" sz="2800" dirty="0"/>
               <a:t>Add a new table, use triggers to sync data</a:t>
             </a:r>
           </a:p>
           <a:p>
-            <a:r>
-              <a:rPr lang="en-US" dirty="0"/>
+            <a:pPr lvl="1"/>
+            <a:r>
+              <a:rPr lang="en-US" sz="2400" dirty="0"/>
+              <a:t>Only columns being moved</a:t>
+            </a:r>
+          </a:p>
+          <a:p>
+            <a:r>
+              <a:rPr lang="en-US" sz="2800" dirty="0"/>
               <a:t>Remove the columns from the original table later</a:t>
+            </a:r>
+          </a:p>
+          <a:p>
+            <a:r>
+              <a:rPr lang="en-US" sz="2800" dirty="0"/>
+              <a:t>Coordinate with apps to ensure feature toggles all flip</a:t>
             </a:r>
           </a:p>
         </p:txBody>
@@ -17400,40 +17414,47 @@
           <a:lstStyle/>
           <a:p>
             <a:r>
-              <a:rPr lang="en-US" dirty="0"/>
+              <a:rPr lang="en-US" sz="2800" dirty="0"/>
               <a:t>A merge is the reverse of a split</a:t>
             </a:r>
           </a:p>
           <a:p>
             <a:r>
-              <a:rPr lang="en-US" dirty="0"/>
+              <a:rPr lang="en-US" sz="2800" dirty="0"/>
               <a:t>Can be table or column level</a:t>
             </a:r>
           </a:p>
           <a:p>
             <a:r>
-              <a:rPr lang="en-US" dirty="0"/>
+              <a:rPr lang="en-US" sz="2800" dirty="0"/>
               <a:t>Similar process</a:t>
             </a:r>
           </a:p>
           <a:p>
             <a:pPr lvl="1"/>
             <a:r>
-              <a:rPr lang="en-US" dirty="0"/>
+              <a:rPr lang="en-US" sz="2000" dirty="0"/>
+              <a:t>New storage location</a:t>
+            </a:r>
+          </a:p>
+          <a:p>
+            <a:pPr lvl="1"/>
+            <a:r>
+              <a:rPr lang="en-US" sz="2000" dirty="0"/>
               <a:t>Merge data</a:t>
             </a:r>
           </a:p>
           <a:p>
             <a:pPr lvl="1"/>
             <a:r>
-              <a:rPr lang="en-US" dirty="0"/>
+              <a:rPr lang="en-US" sz="2000" dirty="0"/>
               <a:t>If possible, keep the original values</a:t>
             </a:r>
           </a:p>
           <a:p>
             <a:pPr lvl="1"/>
             <a:r>
-              <a:rPr lang="en-US" dirty="0"/>
+              <a:rPr lang="en-US" sz="2000" dirty="0"/>
               <a:t>Drops occur later</a:t>
             </a:r>
           </a:p>
@@ -18449,10 +18470,15 @@
             <p:ph idx="1"/>
           </p:nvPr>
         </p:nvSpPr>
-        <p:spPr/>
+        <p:spPr>
+          <a:xfrm>
+            <a:off x="457200" y="1123950"/>
+            <a:ext cx="8229600" cy="3394075"/>
+          </a:xfrm>
+        </p:spPr>
         <p:txBody>
           <a:bodyPr>
-            <a:normAutofit fontScale="77500" lnSpcReduction="20000"/>
+            <a:normAutofit fontScale="62500" lnSpcReduction="20000"/>
           </a:bodyPr>
           <a:lstStyle/>
           <a:p>
@@ -18462,9 +18488,17 @@
             </a:r>
           </a:p>
           <a:p>
+            <a:pPr lvl="1"/>
             <a:r>
               <a:rPr lang="en-US" dirty="0"/>
-              <a:t>Test this to verify the code is correct</a:t>
+              <a:t>Coordination with app is hard</a:t>
+            </a:r>
+          </a:p>
+          <a:p>
+            <a:pPr lvl="1"/>
+            <a:r>
+              <a:rPr lang="en-US" dirty="0"/>
+              <a:t>NOT Zero downtime usually</a:t>
             </a:r>
           </a:p>
           <a:p>
@@ -18487,13 +18521,8 @@
             <a:pPr lvl="1"/>
             <a:r>
               <a:rPr lang="en-US" dirty="0"/>
-              <a:t>Only if you are sure all apps have </a:t>
-            </a:r>
-            <a:r>
-              <a:rPr lang="en-US" dirty="0" err="1"/>
-              <a:t>rev’d</a:t>
-            </a:r>
-            <a:endParaRPr lang="en-US" dirty="0"/>
+              <a:t>Only if you are sure all apps can rev</a:t>
+            </a:r>
           </a:p>
           <a:p>
             <a:pPr lvl="1"/>
@@ -18512,7 +18541,14 @@
             <a:pPr lvl="1"/>
             <a:r>
               <a:rPr lang="en-US" dirty="0"/>
-              <a:t>adding a new column/view</a:t>
+              <a:t>Adding a new column/view</a:t>
+            </a:r>
+          </a:p>
+          <a:p>
+            <a:pPr lvl="1"/>
+            <a:r>
+              <a:rPr lang="en-US" dirty="0"/>
+              <a:t>Flip feature toggle in apps</a:t>
             </a:r>
           </a:p>
           <a:p>
@@ -18523,11 +18559,11 @@
             </a:r>
             <a:r>
               <a:rPr lang="en-US" dirty="0" err="1"/>
-              <a:t>Xevents</a:t>
+              <a:t>xEvents</a:t>
             </a:r>
             <a:r>
               <a:rPr lang="en-US" dirty="0"/>
-              <a:t> to check access to the old name</a:t>
+              <a:t> to check access to the old name (maybe)</a:t>
             </a:r>
           </a:p>
           <a:p>
@@ -18770,14 +18806,14 @@
           </a:ln>
           <a:extLst>
             <a:ext uri="{909E8E84-426E-40dd-AFC4-6F175D3DCCD1}">
-              <a14:hiddenFill xmlns:a14="http://schemas.microsoft.com/office/drawing/2010/main" xmlns="">
+              <a14:hiddenFill xmlns="" xmlns:a14="http://schemas.microsoft.com/office/drawing/2010/main">
                 <a:solidFill>
                   <a:srgbClr val="FFFFFF"/>
                 </a:solidFill>
               </a14:hiddenFill>
             </a:ext>
             <a:ext uri="{91240B29-F687-4f45-9708-019B960494DF}">
-              <a14:hiddenLine xmlns:a14="http://schemas.microsoft.com/office/drawing/2010/main" xmlns="" w="9525">
+              <a14:hiddenLine xmlns="" xmlns:a14="http://schemas.microsoft.com/office/drawing/2010/main" w="9525">
                 <a:solidFill>
                   <a:srgbClr val="000000"/>
                 </a:solidFill>
@@ -21085,13 +21121,13 @@
         <p:spPr/>
         <p:txBody>
           <a:bodyPr>
-            <a:normAutofit fontScale="85000" lnSpcReduction="20000"/>
+            <a:normAutofit fontScale="62500" lnSpcReduction="20000"/>
           </a:bodyPr>
           <a:lstStyle/>
           <a:p>
             <a:r>
               <a:rPr lang="en-US" dirty="0"/>
-              <a:t>Add in one deployment, remove in another</a:t>
+              <a:t>Add parameter in one deployment, remove in another</a:t>
             </a:r>
           </a:p>
           <a:p>
@@ -21101,6 +21137,27 @@
             </a:r>
           </a:p>
           <a:p>
+            <a:pPr lvl="1"/>
+            <a:r>
+              <a:rPr lang="en-US" dirty="0"/>
+              <a:t>Prefer old</a:t>
+            </a:r>
+          </a:p>
+          <a:p>
+            <a:pPr lvl="1"/>
+            <a:r>
+              <a:rPr lang="en-US" dirty="0"/>
+              <a:t>Prefer new</a:t>
+            </a:r>
+          </a:p>
+          <a:p>
+            <a:pPr lvl="1"/>
+            <a:r>
+              <a:rPr lang="en-US" dirty="0"/>
+              <a:t>New only</a:t>
+            </a:r>
+          </a:p>
+          <a:p>
             <a:r>
               <a:rPr lang="en-US" dirty="0"/>
               <a:t>Verify logical functionality with/without default parameter</a:t>
@@ -21139,6 +21196,13 @@
             <a:r>
               <a:rPr lang="en-US" dirty="0"/>
               <a:t>.</a:t>
+            </a:r>
+          </a:p>
+          <a:p>
+            <a:pPr lvl="1"/>
+            <a:r>
+              <a:rPr lang="en-US" dirty="0"/>
+              <a:t>Provide feedback to app teams</a:t>
             </a:r>
           </a:p>
         </p:txBody>
@@ -21282,7 +21346,7 @@
         <p:spPr/>
         <p:txBody>
           <a:bodyPr>
-            <a:normAutofit fontScale="92500" lnSpcReduction="20000"/>
+            <a:normAutofit fontScale="70000" lnSpcReduction="20000"/>
           </a:bodyPr>
           <a:lstStyle/>
           <a:p>
@@ -21294,7 +21358,28 @@
           <a:p>
             <a:r>
               <a:rPr lang="en-US" dirty="0"/>
-              <a:t>Use column names in reading result sets</a:t>
+              <a:t>Use column names</a:t>
+            </a:r>
+          </a:p>
+          <a:p>
+            <a:pPr lvl="1"/>
+            <a:r>
+              <a:rPr lang="en-US" dirty="0"/>
+              <a:t>Result sets</a:t>
+            </a:r>
+          </a:p>
+          <a:p>
+            <a:pPr lvl="1"/>
+            <a:r>
+              <a:rPr lang="en-US" dirty="0"/>
+              <a:t>SQL code</a:t>
+            </a:r>
+          </a:p>
+          <a:p>
+            <a:pPr lvl="1"/>
+            <a:r>
+              <a:rPr lang="en-US" dirty="0"/>
+              <a:t>No numbers for columns</a:t>
             </a:r>
           </a:p>
           <a:p>
@@ -21429,6 +21514,13 @@
             </a:r>
           </a:p>
           <a:p>
+            <a:pPr lvl="1"/>
+            <a:r>
+              <a:rPr lang="en-US" dirty="0"/>
+              <a:t>Removal is a separate deployment</a:t>
+            </a:r>
+          </a:p>
+          <a:p>
             <a:r>
               <a:rPr lang="en-US" dirty="0"/>
               <a:t>Avoid renames (aliases, synonyms, views can help here)</a:t>
@@ -21665,6 +21757,548 @@
 
 <file path=ppt/slides/slide38.xml><?xml version="1.0" encoding="utf-8"?>
 <p:sld xmlns:a="http://schemas.openxmlformats.org/drawingml/2006/main" xmlns:r="http://schemas.openxmlformats.org/officeDocument/2006/relationships" xmlns:p="http://schemas.openxmlformats.org/presentationml/2006/main">
+  <p:cSld>
+    <p:spTree>
+      <p:nvGrpSpPr>
+        <p:cNvPr id="1" name=""/>
+        <p:cNvGrpSpPr/>
+        <p:nvPr/>
+      </p:nvGrpSpPr>
+      <p:grpSpPr>
+        <a:xfrm>
+          <a:off x="0" y="0"/>
+          <a:ext cx="0" cy="0"/>
+          <a:chOff x="0" y="0"/>
+          <a:chExt cx="0" cy="0"/>
+        </a:xfrm>
+      </p:grpSpPr>
+      <p:sp>
+        <p:nvSpPr>
+          <p:cNvPr id="2" name="Title 1"/>
+          <p:cNvSpPr>
+            <a:spLocks noGrp="1"/>
+          </p:cNvSpPr>
+          <p:nvPr>
+            <p:ph type="title"/>
+          </p:nvPr>
+        </p:nvSpPr>
+        <p:spPr/>
+        <p:txBody>
+          <a:bodyPr/>
+          <a:lstStyle/>
+          <a:p>
+            <a:r>
+              <a:rPr lang="en-US" b="1" dirty="0"/>
+              <a:t>Session Survey</a:t>
+            </a:r>
+          </a:p>
+        </p:txBody>
+      </p:sp>
+      <p:sp>
+        <p:nvSpPr>
+          <p:cNvPr id="3" name="Content Placeholder 2"/>
+          <p:cNvSpPr>
+            <a:spLocks noGrp="1"/>
+          </p:cNvSpPr>
+          <p:nvPr>
+            <p:ph idx="1"/>
+          </p:nvPr>
+        </p:nvSpPr>
+        <p:spPr>
+          <a:xfrm>
+            <a:off x="464695" y="1063625"/>
+            <a:ext cx="8229600" cy="3394075"/>
+          </a:xfrm>
+        </p:spPr>
+        <p:txBody>
+          <a:bodyPr>
+            <a:normAutofit fontScale="85000" lnSpcReduction="20000"/>
+          </a:bodyPr>
+          <a:lstStyle/>
+          <a:p>
+            <a:r>
+              <a:rPr lang="en-US" dirty="0"/>
+              <a:t>Your feedback is very important to us</a:t>
+            </a:r>
+          </a:p>
+          <a:p>
+            <a:r>
+              <a:rPr lang="en-US" dirty="0"/>
+              <a:t>Please take a moment to complete the session survey found in the mobile app</a:t>
+            </a:r>
+          </a:p>
+          <a:p>
+            <a:r>
+              <a:rPr lang="en-US" dirty="0"/>
+              <a:t>Use the QR code or search for “Converge360 Events” in your app store</a:t>
+            </a:r>
+          </a:p>
+          <a:p>
+            <a:r>
+              <a:rPr lang="en-US" dirty="0"/>
+              <a:t>Find this session on the Agenda tab</a:t>
+            </a:r>
+          </a:p>
+          <a:p>
+            <a:r>
+              <a:rPr lang="en-US" dirty="0"/>
+              <a:t>Click “Session Evaluation”</a:t>
+            </a:r>
+          </a:p>
+          <a:p>
+            <a:r>
+              <a:rPr lang="en-US" dirty="0"/>
+              <a:t>Thank you! </a:t>
+            </a:r>
+          </a:p>
+        </p:txBody>
+      </p:sp>
+      <p:pic>
+        <p:nvPicPr>
+          <p:cNvPr id="4" name="Picture 3"/>
+          <p:cNvPicPr>
+            <a:picLocks noChangeAspect="1"/>
+          </p:cNvPicPr>
+          <p:nvPr/>
+        </p:nvPicPr>
+        <p:blipFill>
+          <a:blip r:embed="rId2" cstate="print">
+            <a:extLst>
+              <a:ext uri="{28A0092B-C50C-407E-A947-70E740481C1C}">
+                <a14:useLocalDpi xmlns:a14="http://schemas.microsoft.com/office/drawing/2010/main" val="0"/>
+              </a:ext>
+            </a:extLst>
+          </a:blip>
+          <a:stretch>
+            <a:fillRect/>
+          </a:stretch>
+        </p:blipFill>
+        <p:spPr>
+          <a:xfrm>
+            <a:off x="6248400" y="2876550"/>
+            <a:ext cx="1428750" cy="1428750"/>
+          </a:xfrm>
+          <a:prstGeom prst="rect">
+            <a:avLst/>
+          </a:prstGeom>
+        </p:spPr>
+      </p:pic>
+      <p:sp>
+        <p:nvSpPr>
+          <p:cNvPr id="5" name="Rectangle 4">
+            <a:extLst>
+              <a:ext uri="{FF2B5EF4-FFF2-40B4-BE49-F238E27FC236}">
+                <a16:creationId xmlns:a16="http://schemas.microsoft.com/office/drawing/2014/main" id="{6E71DEF1-5908-CDC9-F9C2-6EFBE898DA60}"/>
+              </a:ext>
+            </a:extLst>
+          </p:cNvPr>
+          <p:cNvSpPr/>
+          <p:nvPr/>
+        </p:nvSpPr>
+        <p:spPr>
+          <a:xfrm>
+            <a:off x="3978149" y="4316873"/>
+            <a:ext cx="1450181" cy="300082"/>
+          </a:xfrm>
+          <a:prstGeom prst="rect">
+            <a:avLst/>
+          </a:prstGeom>
+        </p:spPr>
+        <p:txBody>
+          <a:bodyPr>
+            <a:spAutoFit/>
+          </a:bodyPr>
+          <a:lstStyle/>
+          <a:p>
+            <a:pPr defTabSz="514350">
+              <a:spcAft>
+                <a:spcPts val="2025"/>
+              </a:spcAft>
+              <a:defRPr/>
+            </a:pPr>
+            <a:r>
+              <a:rPr lang="en-US" sz="1350" dirty="0">
+                <a:solidFill>
+                  <a:prstClr val="black">
+                    <a:lumMod val="50000"/>
+                    <a:lumOff val="50000"/>
+                  </a:prstClr>
+                </a:solidFill>
+                <a:latin typeface="Microsoft Sans Serif" panose="020B0604020202020204" pitchFamily="34" charset="0"/>
+              </a:rPr>
+              <a:t>@way0utwest</a:t>
+            </a:r>
+          </a:p>
+        </p:txBody>
+      </p:sp>
+      <p:pic>
+        <p:nvPicPr>
+          <p:cNvPr id="6" name="Picture 5">
+            <a:extLst>
+              <a:ext uri="{FF2B5EF4-FFF2-40B4-BE49-F238E27FC236}">
+                <a16:creationId xmlns:a16="http://schemas.microsoft.com/office/drawing/2014/main" id="{BF027910-B5C6-A746-3715-492E7F62C567}"/>
+              </a:ext>
+            </a:extLst>
+          </p:cNvPr>
+          <p:cNvPicPr>
+            <a:picLocks noChangeAspect="1" noChangeArrowheads="1"/>
+          </p:cNvPicPr>
+          <p:nvPr/>
+        </p:nvPicPr>
+        <p:blipFill>
+          <a:blip r:embed="rId3">
+            <a:extLst>
+              <a:ext uri="{28A0092B-C50C-407E-A947-70E740481C1C}">
+                <a14:useLocalDpi xmlns:a14="http://schemas.microsoft.com/office/drawing/2010/main" val="0"/>
+              </a:ext>
+            </a:extLst>
+          </a:blip>
+          <a:srcRect/>
+          <a:stretch>
+            <a:fillRect/>
+          </a:stretch>
+        </p:blipFill>
+        <p:spPr bwMode="auto">
+          <a:xfrm>
+            <a:off x="3612626" y="4312111"/>
+            <a:ext cx="344091" cy="269081"/>
+          </a:xfrm>
+          <a:prstGeom prst="rect">
+            <a:avLst/>
+          </a:prstGeom>
+          <a:noFill/>
+          <a:ln>
+            <a:noFill/>
+          </a:ln>
+          <a:extLst>
+            <a:ext uri="{909E8E84-426E-40DD-AFC4-6F175D3DCCD1}">
+              <a14:hiddenFill xmlns:a14="http://schemas.microsoft.com/office/drawing/2010/main">
+                <a:solidFill>
+                  <a:srgbClr val="FFFFFF"/>
+                </a:solidFill>
+              </a14:hiddenFill>
+            </a:ext>
+            <a:ext uri="{91240B29-F687-4F45-9708-019B960494DF}">
+              <a14:hiddenLine xmlns:a14="http://schemas.microsoft.com/office/drawing/2010/main" w="9525">
+                <a:solidFill>
+                  <a:srgbClr val="000000"/>
+                </a:solidFill>
+                <a:miter lim="800000"/>
+                <a:headEnd/>
+                <a:tailEnd/>
+              </a14:hiddenLine>
+            </a:ext>
+          </a:extLst>
+        </p:spPr>
+      </p:pic>
+      <p:pic>
+        <p:nvPicPr>
+          <p:cNvPr id="7" name="Picture 6">
+            <a:extLst>
+              <a:ext uri="{FF2B5EF4-FFF2-40B4-BE49-F238E27FC236}">
+                <a16:creationId xmlns:a16="http://schemas.microsoft.com/office/drawing/2014/main" id="{0D16787A-0BF8-1532-1230-5FE4570FDF2F}"/>
+              </a:ext>
+            </a:extLst>
+          </p:cNvPr>
+          <p:cNvPicPr>
+            <a:picLocks noChangeAspect="1" noChangeArrowheads="1"/>
+          </p:cNvPicPr>
+          <p:nvPr/>
+        </p:nvPicPr>
+        <p:blipFill>
+          <a:blip r:embed="rId4" cstate="print">
+            <a:extLst>
+              <a:ext uri="{28A0092B-C50C-407E-A947-70E740481C1C}">
+                <a14:useLocalDpi xmlns:a14="http://schemas.microsoft.com/office/drawing/2010/main" val="0"/>
+              </a:ext>
+            </a:extLst>
+          </a:blip>
+          <a:srcRect/>
+          <a:stretch>
+            <a:fillRect/>
+          </a:stretch>
+        </p:blipFill>
+        <p:spPr bwMode="auto">
+          <a:xfrm>
+            <a:off x="973670" y="4304967"/>
+            <a:ext cx="338138" cy="289322"/>
+          </a:xfrm>
+          <a:prstGeom prst="rect">
+            <a:avLst/>
+          </a:prstGeom>
+          <a:noFill/>
+          <a:ln>
+            <a:noFill/>
+          </a:ln>
+          <a:extLst>
+            <a:ext uri="{909E8E84-426E-40DD-AFC4-6F175D3DCCD1}">
+              <a14:hiddenFill xmlns:a14="http://schemas.microsoft.com/office/drawing/2010/main">
+                <a:solidFill>
+                  <a:srgbClr val="FFFFFF"/>
+                </a:solidFill>
+              </a14:hiddenFill>
+            </a:ext>
+            <a:ext uri="{91240B29-F687-4F45-9708-019B960494DF}">
+              <a14:hiddenLine xmlns:a14="http://schemas.microsoft.com/office/drawing/2010/main" w="9525">
+                <a:solidFill>
+                  <a:srgbClr val="000000"/>
+                </a:solidFill>
+                <a:miter lim="800000"/>
+                <a:headEnd/>
+                <a:tailEnd/>
+              </a14:hiddenLine>
+            </a:ext>
+          </a:extLst>
+        </p:spPr>
+      </p:pic>
+      <p:sp>
+        <p:nvSpPr>
+          <p:cNvPr id="8" name="TextBox 7">
+            <a:extLst>
+              <a:ext uri="{FF2B5EF4-FFF2-40B4-BE49-F238E27FC236}">
+                <a16:creationId xmlns:a16="http://schemas.microsoft.com/office/drawing/2014/main" id="{9836CCDD-91A6-90F6-D41A-1A459971430C}"/>
+              </a:ext>
+            </a:extLst>
+          </p:cNvPr>
+          <p:cNvSpPr txBox="1"/>
+          <p:nvPr/>
+        </p:nvSpPr>
+        <p:spPr>
+          <a:xfrm>
+            <a:off x="1311808" y="4308538"/>
+            <a:ext cx="1401365" cy="300082"/>
+          </a:xfrm>
+          <a:prstGeom prst="rect">
+            <a:avLst/>
+          </a:prstGeom>
+          <a:noFill/>
+        </p:spPr>
+        <p:txBody>
+          <a:bodyPr>
+            <a:spAutoFit/>
+          </a:bodyPr>
+          <a:lstStyle/>
+          <a:p>
+            <a:pPr defTabSz="514350">
+              <a:spcAft>
+                <a:spcPts val="2025"/>
+              </a:spcAft>
+              <a:defRPr/>
+            </a:pPr>
+            <a:r>
+              <a:rPr lang="en-US" sz="1350" dirty="0">
+                <a:solidFill>
+                  <a:prstClr val="black">
+                    <a:lumMod val="50000"/>
+                    <a:lumOff val="50000"/>
+                  </a:prstClr>
+                </a:solidFill>
+                <a:latin typeface="Microsoft Sans Serif" panose="020B0604020202020204" pitchFamily="34" charset="0"/>
+              </a:rPr>
+              <a:t>/in/way0utwest</a:t>
+            </a:r>
+          </a:p>
+        </p:txBody>
+      </p:sp>
+      <p:pic>
+        <p:nvPicPr>
+          <p:cNvPr id="9" name="Picture 8">
+            <a:extLst>
+              <a:ext uri="{FF2B5EF4-FFF2-40B4-BE49-F238E27FC236}">
+                <a16:creationId xmlns:a16="http://schemas.microsoft.com/office/drawing/2014/main" id="{9A3C9972-559A-3EA6-6F9E-24E5FC13678B}"/>
+              </a:ext>
+            </a:extLst>
+          </p:cNvPr>
+          <p:cNvPicPr>
+            <a:picLocks noChangeAspect="1" noChangeArrowheads="1"/>
+          </p:cNvPicPr>
+          <p:nvPr/>
+        </p:nvPicPr>
+        <p:blipFill>
+          <a:blip r:embed="rId5">
+            <a:extLst>
+              <a:ext uri="{28A0092B-C50C-407E-A947-70E740481C1C}">
+                <a14:useLocalDpi xmlns:a14="http://schemas.microsoft.com/office/drawing/2010/main" val="0"/>
+              </a:ext>
+            </a:extLst>
+          </a:blip>
+          <a:srcRect/>
+          <a:stretch>
+            <a:fillRect/>
+          </a:stretch>
+        </p:blipFill>
+        <p:spPr bwMode="auto">
+          <a:xfrm>
+            <a:off x="3651935" y="4661855"/>
+            <a:ext cx="252413" cy="277416"/>
+          </a:xfrm>
+          <a:prstGeom prst="rect">
+            <a:avLst/>
+          </a:prstGeom>
+          <a:noFill/>
+          <a:ln>
+            <a:noFill/>
+          </a:ln>
+          <a:extLst>
+            <a:ext uri="{909E8E84-426E-40DD-AFC4-6F175D3DCCD1}">
+              <a14:hiddenFill xmlns:a14="http://schemas.microsoft.com/office/drawing/2010/main">
+                <a:solidFill>
+                  <a:srgbClr val="FFFFFF"/>
+                </a:solidFill>
+              </a14:hiddenFill>
+            </a:ext>
+            <a:ext uri="{91240B29-F687-4F45-9708-019B960494DF}">
+              <a14:hiddenLine xmlns:a14="http://schemas.microsoft.com/office/drawing/2010/main" w="9525">
+                <a:solidFill>
+                  <a:srgbClr val="000000"/>
+                </a:solidFill>
+                <a:miter lim="800000"/>
+                <a:headEnd/>
+                <a:tailEnd/>
+              </a14:hiddenLine>
+            </a:ext>
+          </a:extLst>
+        </p:spPr>
+      </p:pic>
+      <p:sp>
+        <p:nvSpPr>
+          <p:cNvPr id="10" name="Rectangle 9">
+            <a:extLst>
+              <a:ext uri="{FF2B5EF4-FFF2-40B4-BE49-F238E27FC236}">
+                <a16:creationId xmlns:a16="http://schemas.microsoft.com/office/drawing/2014/main" id="{B79A83B3-7980-6111-489B-F92713726ADB}"/>
+              </a:ext>
+            </a:extLst>
+          </p:cNvPr>
+          <p:cNvSpPr/>
+          <p:nvPr/>
+        </p:nvSpPr>
+        <p:spPr>
+          <a:xfrm>
+            <a:off x="1334829" y="4671069"/>
+            <a:ext cx="2398149" cy="276999"/>
+          </a:xfrm>
+          <a:prstGeom prst="rect">
+            <a:avLst/>
+          </a:prstGeom>
+        </p:spPr>
+        <p:txBody>
+          <a:bodyPr wrap="square">
+            <a:spAutoFit/>
+          </a:bodyPr>
+          <a:lstStyle/>
+          <a:p>
+            <a:pPr>
+              <a:spcAft>
+                <a:spcPts val="2700"/>
+              </a:spcAft>
+            </a:pPr>
+            <a:r>
+              <a:rPr lang="en-US" sz="1200" dirty="0" err="1">
+                <a:latin typeface="Roboto Regular" panose="02000000000000000000" pitchFamily="2" charset="0"/>
+                <a:ea typeface="Roboto Regular" panose="02000000000000000000" pitchFamily="2" charset="0"/>
+              </a:rPr>
+              <a:t>sjones@sqlservercentral.com</a:t>
+            </a:r>
+            <a:endParaRPr lang="en-US" sz="1200" dirty="0">
+              <a:latin typeface="Roboto Regular" panose="02000000000000000000" pitchFamily="2" charset="0"/>
+              <a:ea typeface="Roboto Regular" panose="02000000000000000000" pitchFamily="2" charset="0"/>
+            </a:endParaRPr>
+          </a:p>
+        </p:txBody>
+      </p:sp>
+      <p:pic>
+        <p:nvPicPr>
+          <p:cNvPr id="11" name="Picture 10">
+            <a:extLst>
+              <a:ext uri="{FF2B5EF4-FFF2-40B4-BE49-F238E27FC236}">
+                <a16:creationId xmlns:a16="http://schemas.microsoft.com/office/drawing/2014/main" id="{6962C554-E655-4F80-CE17-5CE437B65893}"/>
+              </a:ext>
+            </a:extLst>
+          </p:cNvPr>
+          <p:cNvPicPr>
+            <a:picLocks noChangeAspect="1"/>
+          </p:cNvPicPr>
+          <p:nvPr/>
+        </p:nvPicPr>
+        <p:blipFill>
+          <a:blip r:embed="rId6"/>
+          <a:stretch>
+            <a:fillRect/>
+          </a:stretch>
+        </p:blipFill>
+        <p:spPr>
+          <a:xfrm>
+            <a:off x="1009027" y="4655903"/>
+            <a:ext cx="284337" cy="232639"/>
+          </a:xfrm>
+          <a:prstGeom prst="rect">
+            <a:avLst/>
+          </a:prstGeom>
+        </p:spPr>
+      </p:pic>
+      <p:sp>
+        <p:nvSpPr>
+          <p:cNvPr id="12" name="Rectangle 11">
+            <a:extLst>
+              <a:ext uri="{FF2B5EF4-FFF2-40B4-BE49-F238E27FC236}">
+                <a16:creationId xmlns:a16="http://schemas.microsoft.com/office/drawing/2014/main" id="{E5FD60BD-9B1F-46B0-1643-04C8B6B017AA}"/>
+              </a:ext>
+            </a:extLst>
+          </p:cNvPr>
+          <p:cNvSpPr/>
+          <p:nvPr/>
+        </p:nvSpPr>
+        <p:spPr>
+          <a:xfrm>
+            <a:off x="3904347" y="4660665"/>
+            <a:ext cx="2100263" cy="300082"/>
+          </a:xfrm>
+          <a:prstGeom prst="rect">
+            <a:avLst/>
+          </a:prstGeom>
+        </p:spPr>
+        <p:txBody>
+          <a:bodyPr>
+            <a:spAutoFit/>
+          </a:bodyPr>
+          <a:lstStyle/>
+          <a:p>
+            <a:pPr defTabSz="514350">
+              <a:spcAft>
+                <a:spcPts val="2025"/>
+              </a:spcAft>
+              <a:defRPr/>
+            </a:pPr>
+            <a:r>
+              <a:rPr lang="en-US" sz="1350" dirty="0">
+                <a:solidFill>
+                  <a:prstClr val="black">
+                    <a:lumMod val="50000"/>
+                    <a:lumOff val="50000"/>
+                  </a:prstClr>
+                </a:solidFill>
+                <a:latin typeface="Microsoft Sans Serif" panose="020B0604020202020204" pitchFamily="34" charset="0"/>
+              </a:rPr>
+              <a:t>www.voiceofthedba.com</a:t>
+            </a:r>
+          </a:p>
+        </p:txBody>
+      </p:sp>
+    </p:spTree>
+    <p:extLst>
+      <p:ext uri="{BB962C8B-B14F-4D97-AF65-F5344CB8AC3E}">
+        <p14:creationId xmlns:p14="http://schemas.microsoft.com/office/powerpoint/2010/main" val="1575677855"/>
+      </p:ext>
+    </p:extLst>
+  </p:cSld>
+  <p:clrMapOvr>
+    <a:masterClrMapping/>
+  </p:clrMapOvr>
+</p:sld>
+</file>
+
+<file path=ppt/slides/slide39.xml><?xml version="1.0" encoding="utf-8"?>
+<p:sld xmlns:a="http://schemas.openxmlformats.org/drawingml/2006/main" xmlns:r="http://schemas.openxmlformats.org/officeDocument/2006/relationships" xmlns:p="http://schemas.openxmlformats.org/presentationml/2006/main" show="0">
   <p:cSld>
     <p:spTree>
       <p:nvGrpSpPr>
@@ -22228,7 +22862,61 @@
 </p:sld>
 </file>
 
-<file path=ppt/slides/slide39.xml><?xml version="1.0" encoding="utf-8"?>
+<file path=ppt/slides/slide4.xml><?xml version="1.0" encoding="utf-8"?>
+<p:sld xmlns:a="http://schemas.openxmlformats.org/drawingml/2006/main" xmlns:r="http://schemas.openxmlformats.org/officeDocument/2006/relationships" xmlns:p="http://schemas.openxmlformats.org/presentationml/2006/main">
+  <p:cSld>
+    <p:spTree>
+      <p:nvGrpSpPr>
+        <p:cNvPr id="1" name=""/>
+        <p:cNvGrpSpPr/>
+        <p:nvPr/>
+      </p:nvGrpSpPr>
+      <p:grpSpPr>
+        <a:xfrm>
+          <a:off x="0" y="0"/>
+          <a:ext cx="0" cy="0"/>
+          <a:chOff x="0" y="0"/>
+          <a:chExt cx="0" cy="0"/>
+        </a:xfrm>
+      </p:grpSpPr>
+      <p:sp>
+        <p:nvSpPr>
+          <p:cNvPr id="4" name="Title 3"/>
+          <p:cNvSpPr>
+            <a:spLocks noGrp="1"/>
+          </p:cNvSpPr>
+          <p:nvPr>
+            <p:ph type="title"/>
+          </p:nvPr>
+        </p:nvSpPr>
+        <p:spPr/>
+        <p:txBody>
+          <a:bodyPr>
+            <a:normAutofit fontScale="90000"/>
+          </a:bodyPr>
+          <a:lstStyle/>
+          <a:p>
+            <a:r>
+              <a:rPr lang="en-US" dirty="0"/>
+              <a:t>Defining Zero Downtime for Databases</a:t>
+            </a:r>
+          </a:p>
+        </p:txBody>
+      </p:sp>
+    </p:spTree>
+    <p:extLst>
+      <p:ext uri="{BB962C8B-B14F-4D97-AF65-F5344CB8AC3E}">
+        <p14:creationId xmlns:p14="http://schemas.microsoft.com/office/powerpoint/2010/main" val="1631803677"/>
+      </p:ext>
+    </p:extLst>
+  </p:cSld>
+  <p:clrMapOvr>
+    <a:masterClrMapping/>
+  </p:clrMapOvr>
+</p:sld>
+</file>
+
+<file path=ppt/slides/slide40.xml><?xml version="1.0" encoding="utf-8"?>
 <p:sld xmlns:a="http://schemas.openxmlformats.org/drawingml/2006/main" xmlns:r="http://schemas.openxmlformats.org/officeDocument/2006/relationships" xmlns:p="http://schemas.openxmlformats.org/presentationml/2006/main">
   <p:cSld>
     <p:spTree>
@@ -22684,60 +23372,6 @@
 </p:sld>
 </file>
 
-<file path=ppt/slides/slide4.xml><?xml version="1.0" encoding="utf-8"?>
-<p:sld xmlns:a="http://schemas.openxmlformats.org/drawingml/2006/main" xmlns:r="http://schemas.openxmlformats.org/officeDocument/2006/relationships" xmlns:p="http://schemas.openxmlformats.org/presentationml/2006/main">
-  <p:cSld>
-    <p:spTree>
-      <p:nvGrpSpPr>
-        <p:cNvPr id="1" name=""/>
-        <p:cNvGrpSpPr/>
-        <p:nvPr/>
-      </p:nvGrpSpPr>
-      <p:grpSpPr>
-        <a:xfrm>
-          <a:off x="0" y="0"/>
-          <a:ext cx="0" cy="0"/>
-          <a:chOff x="0" y="0"/>
-          <a:chExt cx="0" cy="0"/>
-        </a:xfrm>
-      </p:grpSpPr>
-      <p:sp>
-        <p:nvSpPr>
-          <p:cNvPr id="4" name="Title 3"/>
-          <p:cNvSpPr>
-            <a:spLocks noGrp="1"/>
-          </p:cNvSpPr>
-          <p:nvPr>
-            <p:ph type="title"/>
-          </p:nvPr>
-        </p:nvSpPr>
-        <p:spPr/>
-        <p:txBody>
-          <a:bodyPr>
-            <a:normAutofit fontScale="90000"/>
-          </a:bodyPr>
-          <a:lstStyle/>
-          <a:p>
-            <a:r>
-              <a:rPr lang="en-US" dirty="0"/>
-              <a:t>Defining Zero Downtime for Databases</a:t>
-            </a:r>
-          </a:p>
-        </p:txBody>
-      </p:sp>
-    </p:spTree>
-    <p:extLst>
-      <p:ext uri="{BB962C8B-B14F-4D97-AF65-F5344CB8AC3E}">
-        <p14:creationId xmlns:p14="http://schemas.microsoft.com/office/powerpoint/2010/main" val="1631803677"/>
-      </p:ext>
-    </p:extLst>
-  </p:cSld>
-  <p:clrMapOvr>
-    <a:masterClrMapping/>
-  </p:clrMapOvr>
-</p:sld>
-</file>
-
 <file path=ppt/slides/slide5.xml><?xml version="1.0" encoding="utf-8"?>
 <p:sld xmlns:a="http://schemas.openxmlformats.org/drawingml/2006/main" xmlns:r="http://schemas.openxmlformats.org/officeDocument/2006/relationships" xmlns:p="http://schemas.openxmlformats.org/presentationml/2006/main">
   <p:cSld>
@@ -23120,7 +23754,7 @@
         </p:nvSpPr>
         <p:spPr>
           <a:xfrm>
-            <a:off x="457200" y="1200150"/>
+            <a:off x="457200" y="1123950"/>
             <a:ext cx="8458200" cy="3394075"/>
           </a:xfrm>
         </p:spPr>
@@ -23132,13 +23766,13 @@
           <a:p>
             <a:pPr>
               <a:lnSpc>
-                <a:spcPct val="150000"/>
+                <a:spcPct val="110000"/>
               </a:lnSpc>
               <a:buFont typeface="Courier New" panose="02070309020205020404" pitchFamily="49" charset="0"/>
               <a:buChar char="o"/>
             </a:pPr>
             <a:r>
-              <a:rPr lang="en-GB" sz="2200" dirty="0">
+              <a:rPr lang="en-GB" sz="2400" dirty="0">
                 <a:solidFill>
                   <a:schemeClr val="bg2">
                     <a:lumMod val="10000"/>
@@ -23153,25 +23787,13 @@
           <a:p>
             <a:pPr marL="685800" lvl="1" indent="-342900">
               <a:lnSpc>
-                <a:spcPct val="150000"/>
+                <a:spcPct val="110000"/>
               </a:lnSpc>
               <a:buFont typeface="Courier New" panose="02070309020205020404" pitchFamily="49" charset="0"/>
               <a:buChar char="o"/>
             </a:pPr>
             <a:r>
-              <a:rPr lang="en-GB" sz="1700" dirty="0">
-                <a:solidFill>
-                  <a:schemeClr val="bg2">
-                    <a:lumMod val="10000"/>
-                  </a:schemeClr>
-                </a:solidFill>
-                <a:ea typeface="Roboto Regular" panose="02000000000000000000" pitchFamily="2" charset="0"/>
-                <a:cs typeface="Roboto Regular" panose="02000000000000000000" pitchFamily="2" charset="0"/>
-              </a:rPr>
-              <a:t>Expand/Contract model - </a:t>
-            </a:r>
-            <a:r>
-              <a:rPr lang="en-GB" sz="1700" dirty="0">
+              <a:rPr lang="en-GB" sz="2000" dirty="0">
                 <a:solidFill>
                   <a:schemeClr val="bg2">
                     <a:lumMod val="10000"/>
@@ -23181,28 +23803,52 @@
                 <a:cs typeface="Roboto Regular" panose="02000000000000000000" pitchFamily="2" charset="0"/>
                 <a:hlinkClick r:id="rId2"/>
               </a:rPr>
-              <a:t>https://martinfowler.com/bliki/ParallelChange.html</a:t>
-            </a:r>
-            <a:endParaRPr lang="en-GB" sz="1700" dirty="0">
-              <a:solidFill>
-                <a:schemeClr val="bg2">
-                  <a:lumMod val="10000"/>
-                </a:schemeClr>
-              </a:solidFill>
-              <a:ea typeface="Roboto Regular" panose="02000000000000000000" pitchFamily="2" charset="0"/>
-              <a:cs typeface="Roboto Regular" panose="02000000000000000000" pitchFamily="2" charset="0"/>
-            </a:endParaRPr>
-          </a:p>
-          <a:p>
-            <a:pPr>
+              <a:t>Expand/Contract model</a:t>
+            </a:r>
+            <a:r>
+              <a:rPr lang="en-GB" sz="2000" dirty="0">
+                <a:solidFill>
+                  <a:schemeClr val="bg2">
+                    <a:lumMod val="10000"/>
+                  </a:schemeClr>
+                </a:solidFill>
+                <a:ea typeface="Roboto Regular" panose="02000000000000000000" pitchFamily="2" charset="0"/>
+                <a:cs typeface="Roboto Regular" panose="02000000000000000000" pitchFamily="2" charset="0"/>
+              </a:rPr>
+              <a:t> (Martin Fowler)</a:t>
+            </a:r>
+          </a:p>
+          <a:p>
+            <a:pPr marL="685800" lvl="1" indent="-342900">
               <a:lnSpc>
-                <a:spcPct val="150000"/>
+                <a:spcPct val="110000"/>
               </a:lnSpc>
               <a:buFont typeface="Courier New" panose="02070309020205020404" pitchFamily="49" charset="0"/>
               <a:buChar char="o"/>
             </a:pPr>
             <a:r>
-              <a:rPr lang="en-GB" sz="2200" dirty="0">
+              <a:rPr lang="en-GB" sz="2000" dirty="0">
+                <a:solidFill>
+                  <a:schemeClr val="bg2">
+                    <a:lumMod val="10000"/>
+                  </a:schemeClr>
+                </a:solidFill>
+                <a:ea typeface="Roboto Regular" panose="02000000000000000000" pitchFamily="2" charset="0"/>
+                <a:cs typeface="Roboto Regular" panose="02000000000000000000" pitchFamily="2" charset="0"/>
+              </a:rPr>
+              <a:t>Similar to blue/green for applications</a:t>
+            </a:r>
+          </a:p>
+          <a:p>
+            <a:pPr>
+              <a:lnSpc>
+                <a:spcPct val="110000"/>
+              </a:lnSpc>
+              <a:buFont typeface="Courier New" panose="02070309020205020404" pitchFamily="49" charset="0"/>
+              <a:buChar char="o"/>
+            </a:pPr>
+            <a:r>
+              <a:rPr lang="en-GB" sz="2400" dirty="0">
                 <a:solidFill>
                   <a:schemeClr val="bg2">
                     <a:lumMod val="10000"/>
@@ -23217,13 +23863,13 @@
           <a:p>
             <a:pPr marL="685800" lvl="1" indent="-342900">
               <a:lnSpc>
-                <a:spcPct val="150000"/>
+                <a:spcPct val="110000"/>
               </a:lnSpc>
               <a:buFont typeface="Courier New" panose="02070309020205020404" pitchFamily="49" charset="0"/>
               <a:buChar char="o"/>
             </a:pPr>
             <a:r>
-              <a:rPr lang="en-GB" sz="1700" dirty="0">
+              <a:rPr lang="en-GB" sz="2000" dirty="0">
                 <a:solidFill>
                   <a:schemeClr val="bg2">
                     <a:lumMod val="10000"/>
@@ -23238,13 +23884,13 @@
           <a:p>
             <a:pPr marL="685800" lvl="1" indent="-342900">
               <a:lnSpc>
-                <a:spcPct val="150000"/>
+                <a:spcPct val="110000"/>
               </a:lnSpc>
               <a:buFont typeface="Courier New" panose="02070309020205020404" pitchFamily="49" charset="0"/>
               <a:buChar char="o"/>
             </a:pPr>
             <a:r>
-              <a:rPr lang="en-GB" sz="1700" dirty="0">
+              <a:rPr lang="en-GB" sz="2000" dirty="0">
                 <a:solidFill>
                   <a:schemeClr val="bg2">
                     <a:lumMod val="10000"/>
@@ -23253,7 +23899,28 @@
                 <a:ea typeface="Roboto Regular" panose="02000000000000000000" pitchFamily="2" charset="0"/>
                 <a:cs typeface="Roboto Regular" panose="02000000000000000000" pitchFamily="2" charset="0"/>
               </a:rPr>
-              <a:t>Use this time to make changes outside of a deployment window</a:t>
+              <a:t>Use this time to make changes outside of a single deployment window</a:t>
+            </a:r>
+          </a:p>
+          <a:p>
+            <a:pPr marL="685800" lvl="1" indent="-342900">
+              <a:lnSpc>
+                <a:spcPct val="110000"/>
+              </a:lnSpc>
+              <a:buFont typeface="Courier New" panose="02070309020205020404" pitchFamily="49" charset="0"/>
+              <a:buChar char="o"/>
+            </a:pPr>
+            <a:r>
+              <a:rPr lang="en-GB" sz="2000" dirty="0">
+                <a:solidFill>
+                  <a:schemeClr val="bg2">
+                    <a:lumMod val="10000"/>
+                  </a:schemeClr>
+                </a:solidFill>
+                <a:ea typeface="Roboto Regular" panose="02000000000000000000" pitchFamily="2" charset="0"/>
+                <a:cs typeface="Roboto Regular" panose="02000000000000000000" pitchFamily="2" charset="0"/>
+              </a:rPr>
+              <a:t>Use multiple deployments</a:t>
             </a:r>
           </a:p>
         </p:txBody>
@@ -23322,8 +23989,8 @@
         </p:nvSpPr>
         <p:spPr>
           <a:xfrm>
-            <a:off x="457200" y="1123950"/>
-            <a:ext cx="8362950" cy="3500438"/>
+            <a:off x="457200" y="1123949"/>
+            <a:ext cx="8362950" cy="3813175"/>
           </a:xfrm>
         </p:spPr>
         <p:txBody>
@@ -23340,7 +24007,7 @@
               <a:buChar char="o"/>
             </a:pPr>
             <a:r>
-              <a:rPr lang="en-GB" sz="1800" dirty="0">
+              <a:rPr lang="en-GB" sz="2400" dirty="0">
                 <a:solidFill>
                   <a:schemeClr val="bg2">
                     <a:lumMod val="10000"/>
@@ -23361,7 +24028,7 @@
               <a:buChar char="o"/>
             </a:pPr>
             <a:r>
-              <a:rPr lang="en-US" sz="1800" i="0" dirty="0">
+              <a:rPr lang="en-US" sz="2400" i="0" dirty="0">
                 <a:solidFill>
                   <a:srgbClr val="444444"/>
                 </a:solidFill>
@@ -23371,7 +24038,7 @@
               </a:rPr>
               <a:t>“Baby steps”: If a change is backward-incompatible, split it into multiple backward-compatible steps.</a:t>
             </a:r>
-            <a:endParaRPr lang="en-GB" sz="1800" dirty="0">
+            <a:endParaRPr lang="en-GB" sz="2400" dirty="0">
               <a:solidFill>
                 <a:schemeClr val="bg2">
                   <a:lumMod val="10000"/>
@@ -23390,7 +24057,7 @@
               <a:buChar char="o"/>
             </a:pPr>
             <a:r>
-              <a:rPr lang="en-GB" sz="1800" dirty="0">
+              <a:rPr lang="en-GB" sz="2400" dirty="0">
                 <a:solidFill>
                   <a:schemeClr val="bg2">
                     <a:lumMod val="10000"/>
@@ -23399,7 +24066,7 @@
                 <a:ea typeface="Roboto Regular" panose="02000000000000000000" pitchFamily="2" charset="0"/>
                 <a:cs typeface="Roboto Regular" panose="02000000000000000000" pitchFamily="2" charset="0"/>
               </a:rPr>
-              <a:t>Ensure the database can rev 1 version without affecting the application</a:t>
+              <a:t>Ensure the db can rev 1 version without the app</a:t>
             </a:r>
           </a:p>
           <a:p>
@@ -23411,7 +24078,7 @@
               <a:buChar char="o"/>
             </a:pPr>
             <a:r>
-              <a:rPr lang="en-GB" sz="1800" dirty="0">
+              <a:rPr lang="en-GB" sz="2400" dirty="0">
                 <a:solidFill>
                   <a:schemeClr val="bg2">
                     <a:lumMod val="10000"/>
@@ -23432,7 +24099,7 @@
               <a:buChar char="o"/>
             </a:pPr>
             <a:r>
-              <a:rPr lang="en-GB" sz="1400" dirty="0">
+              <a:rPr lang="en-GB" sz="1800" dirty="0">
                 <a:solidFill>
                   <a:schemeClr val="bg2">
                     <a:lumMod val="10000"/>

</xml_diff>